<commit_message>
telle que déposée sur moodle
</commit_message>
<xml_diff>
--- a/PresentationDL_JGorse.pptx
+++ b/PresentationDL_JGorse.pptx
@@ -3405,7 +3405,7 @@
             <a:pPr algn="ctr"/>
             <a:r>
               <a:rPr lang="fr-FR" sz="2400" dirty="0"/>
-              <a:t>M2 BIB 2019-202</a:t>
+              <a:t>M2 BIB 2019-2020</a:t>
             </a:r>
           </a:p>
         </p:txBody>
@@ -3439,20 +3439,33 @@
           <a:p>
             <a:pPr algn="ctr"/>
             <a:r>
-              <a:rPr lang="fr-FR" sz="4400" dirty="0">
+              <a:rPr lang="fr-FR" sz="4400" b="1" dirty="0">
                 <a:solidFill>
                   <a:srgbClr val="0070C0"/>
                 </a:solidFill>
                 <a:latin typeface="Al Tarikh" pitchFamily="2" charset="-78"/>
                 <a:cs typeface="Al Tarikh" pitchFamily="2" charset="-78"/>
               </a:rPr>
-              <a:t>Classification de poches de fixation ligands/protéines </a:t>
+              <a:t>Classification de poches de fixation </a:t>
             </a:r>
           </a:p>
           <a:p>
             <a:pPr algn="ctr"/>
             <a:r>
-              <a:rPr lang="fr-FR" sz="4400" dirty="0">
+              <a:rPr lang="fr-FR" sz="4400" b="1" dirty="0">
+                <a:solidFill>
+                  <a:srgbClr val="0070C0"/>
+                </a:solidFill>
+                <a:latin typeface="Al Tarikh" pitchFamily="2" charset="-78"/>
+                <a:cs typeface="Al Tarikh" pitchFamily="2" charset="-78"/>
+              </a:rPr>
+              <a:t>ligands/ protéines </a:t>
+            </a:r>
+          </a:p>
+          <a:p>
+            <a:pPr algn="ctr"/>
+            <a:r>
+              <a:rPr lang="fr-FR" sz="4400" b="1" dirty="0">
                 <a:solidFill>
                   <a:srgbClr val="0070C0"/>
                 </a:solidFill>
@@ -3524,7 +3537,10 @@
           <a:p>
             <a:pPr algn="ctr"/>
             <a:r>
-              <a:rPr lang="fr-FR" sz="4400" dirty="0">
+              <a:rPr lang="fr-FR" sz="4400" b="1" dirty="0">
+                <a:solidFill>
+                  <a:srgbClr val="0070C0"/>
+                </a:solidFill>
                 <a:latin typeface="Al Tarikh" pitchFamily="2" charset="-78"/>
                 <a:cs typeface="Al Tarikh" pitchFamily="2" charset="-78"/>
               </a:rPr>
@@ -3591,8 +3607,15 @@
             </a:pPr>
             <a:r>
               <a:rPr lang="fr-FR" sz="2400" dirty="0"/>
-              <a:t>Améliorer les performances du modèle</a:t>
-            </a:r>
+              <a:t>Améliorer les performances du modèle </a:t>
+            </a:r>
+            <a:r>
+              <a:rPr lang="fr-FR" sz="2400" dirty="0">
+                <a:sym typeface="Wingdings" pitchFamily="2" charset="2"/>
+              </a:rPr>
+              <a:t> modification des couches</a:t>
+            </a:r>
+            <a:endParaRPr lang="fr-FR" sz="2400" dirty="0"/>
           </a:p>
           <a:p>
             <a:endParaRPr lang="fr-FR" sz="2400" dirty="0"/>
@@ -3742,17 +3765,17 @@
             <a:pPr algn="ctr"/>
             <a:r>
               <a:rPr lang="fr-FR" sz="2400" dirty="0"/>
-              <a:t>M2 BIB 2019-202</a:t>
+              <a:t>M2 BIB 2019-2020</a:t>
             </a:r>
           </a:p>
         </p:txBody>
       </p:sp>
       <p:sp>
         <p:nvSpPr>
-          <p:cNvPr id="6" name="Rectangle 5">
+          <p:cNvPr id="7" name="Rectangle 6">
             <a:extLst>
               <a:ext uri="{FF2B5EF4-FFF2-40B4-BE49-F238E27FC236}">
-                <a16:creationId xmlns:a16="http://schemas.microsoft.com/office/drawing/2014/main" id="{3AAE9B4E-D84D-3C47-BD33-CEF0B2EE36CB}"/>
+                <a16:creationId xmlns:a16="http://schemas.microsoft.com/office/drawing/2014/main" id="{8DEAA162-3858-BB49-9587-AD7143A20A53}"/>
               </a:ext>
             </a:extLst>
           </p:cNvPr>
@@ -3776,20 +3799,33 @@
           <a:p>
             <a:pPr algn="ctr"/>
             <a:r>
-              <a:rPr lang="fr-FR" sz="4400" dirty="0">
+              <a:rPr lang="fr-FR" sz="4400" b="1" dirty="0">
                 <a:solidFill>
                   <a:srgbClr val="0070C0"/>
                 </a:solidFill>
                 <a:latin typeface="Al Tarikh" pitchFamily="2" charset="-78"/>
                 <a:cs typeface="Al Tarikh" pitchFamily="2" charset="-78"/>
               </a:rPr>
-              <a:t>Classification de poches de fixation ligands/protéines </a:t>
+              <a:t>Classification de poches de fixation </a:t>
             </a:r>
           </a:p>
           <a:p>
             <a:pPr algn="ctr"/>
             <a:r>
-              <a:rPr lang="fr-FR" sz="4400" dirty="0">
+              <a:rPr lang="fr-FR" sz="4400" b="1" dirty="0">
+                <a:solidFill>
+                  <a:srgbClr val="0070C0"/>
+                </a:solidFill>
+                <a:latin typeface="Al Tarikh" pitchFamily="2" charset="-78"/>
+                <a:cs typeface="Al Tarikh" pitchFamily="2" charset="-78"/>
+              </a:rPr>
+              <a:t>ligands/ protéines </a:t>
+            </a:r>
+          </a:p>
+          <a:p>
+            <a:pPr algn="ctr"/>
+            <a:r>
+              <a:rPr lang="fr-FR" sz="4400" b="1" dirty="0">
                 <a:solidFill>
                   <a:srgbClr val="0070C0"/>
                 </a:solidFill>
@@ -3861,7 +3897,10 @@
           <a:p>
             <a:pPr algn="ctr"/>
             <a:r>
-              <a:rPr lang="fr-FR" sz="4400" dirty="0">
+              <a:rPr lang="fr-FR" sz="4400" b="1" dirty="0">
+                <a:solidFill>
+                  <a:srgbClr val="0070C0"/>
+                </a:solidFill>
                 <a:latin typeface="Al Tarikh" pitchFamily="2" charset="-78"/>
                 <a:cs typeface="Al Tarikh" pitchFamily="2" charset="-78"/>
               </a:rPr>
@@ -4084,11 +4123,14 @@
           <a:p>
             <a:pPr algn="ctr"/>
             <a:r>
-              <a:rPr lang="fr-FR" sz="4400" dirty="0">
+              <a:rPr lang="fr-FR" sz="4400" b="1" dirty="0">
+                <a:solidFill>
+                  <a:srgbClr val="0070C0"/>
+                </a:solidFill>
                 <a:latin typeface="Al Tarikh" pitchFamily="2" charset="-78"/>
                 <a:cs typeface="Al Tarikh" pitchFamily="2" charset="-78"/>
               </a:rPr>
-              <a:t>DATASETS DU PROJET</a:t>
+              <a:t>DATASETS</a:t>
             </a:r>
           </a:p>
         </p:txBody>
@@ -4195,7 +4237,7 @@
             </a:r>
             <a:r>
               <a:rPr lang="fr-FR" sz="2400" dirty="0"/>
-              <a:t> data files obtenu par les auteurs après </a:t>
+              <a:t> data files obtenus par les auteurs après </a:t>
             </a:r>
             <a:r>
               <a:rPr lang="fr-FR" sz="2400" dirty="0" err="1"/>
@@ -4268,11 +4310,14 @@
           <a:p>
             <a:pPr algn="ctr"/>
             <a:r>
-              <a:rPr lang="fr-FR" sz="4400" dirty="0">
+              <a:rPr lang="fr-FR" sz="4400" b="1" dirty="0">
+                <a:solidFill>
+                  <a:srgbClr val="0070C0"/>
+                </a:solidFill>
                 <a:latin typeface="Al Tarikh" pitchFamily="2" charset="-78"/>
                 <a:cs typeface="Al Tarikh" pitchFamily="2" charset="-78"/>
               </a:rPr>
-              <a:t>DATASETS DU PROJET</a:t>
+              <a:t>DATASETS</a:t>
             </a:r>
           </a:p>
         </p:txBody>
@@ -4379,7 +4424,7 @@
             </a:r>
             <a:r>
               <a:rPr lang="fr-FR" sz="2400" dirty="0"/>
-              <a:t> data files obtenu par les auteurs après </a:t>
+              <a:t> data files obtenus par les auteurs après </a:t>
             </a:r>
             <a:r>
               <a:rPr lang="fr-FR" sz="2400" dirty="0" err="1"/>
@@ -4417,7 +4462,7 @@
                   <a:srgbClr val="0070C0"/>
                 </a:solidFill>
               </a:rPr>
-              <a:t>           JEUX DE DONNEES TEST : 		900 poches différentes</a:t>
+              <a:t>           JEUX DE DONNEES TEST : 		900 poches (différentes)</a:t>
             </a:r>
           </a:p>
         </p:txBody>
@@ -4482,11 +4527,14 @@
           <a:p>
             <a:pPr algn="ctr"/>
             <a:r>
-              <a:rPr lang="fr-FR" sz="4400" dirty="0">
+              <a:rPr lang="fr-FR" sz="4400" b="1" dirty="0">
+                <a:solidFill>
+                  <a:srgbClr val="0070C0"/>
+                </a:solidFill>
                 <a:latin typeface="Al Tarikh" pitchFamily="2" charset="-78"/>
                 <a:cs typeface="Al Tarikh" pitchFamily="2" charset="-78"/>
               </a:rPr>
-              <a:t>WORKFLOW DU PROJET</a:t>
+              <a:t>WORKFLOW</a:t>
             </a:r>
           </a:p>
         </p:txBody>
@@ -6212,7 +6260,7 @@
         </p:nvSpPr>
         <p:spPr>
           <a:xfrm>
-            <a:off x="-19328" y="372541"/>
+            <a:off x="0" y="117458"/>
             <a:ext cx="12211327" cy="769441"/>
           </a:xfrm>
           <a:prstGeom prst="rect">
@@ -6228,11 +6276,14 @@
           <a:p>
             <a:pPr algn="ctr"/>
             <a:r>
-              <a:rPr lang="fr-FR" sz="4400" dirty="0">
+              <a:rPr lang="fr-FR" sz="4400" b="1" dirty="0">
+                <a:solidFill>
+                  <a:srgbClr val="0070C0"/>
+                </a:solidFill>
                 <a:latin typeface="Al Tarikh" pitchFamily="2" charset="-78"/>
                 <a:cs typeface="Al Tarikh" pitchFamily="2" charset="-78"/>
               </a:rPr>
-              <a:t>COMPARAISON AVEC DEEP DRUG 3D </a:t>
+              <a:t>COMPARAISON</a:t>
             </a:r>
           </a:p>
         </p:txBody>
@@ -8361,7 +8412,10 @@
           <a:p>
             <a:pPr algn="ctr"/>
             <a:r>
-              <a:rPr lang="fr-FR" sz="4400" dirty="0">
+              <a:rPr lang="fr-FR" sz="4400" b="1" dirty="0">
+                <a:solidFill>
+                  <a:srgbClr val="0070C0"/>
+                </a:solidFill>
                 <a:latin typeface="Al Tarikh" pitchFamily="2" charset="-78"/>
                 <a:cs typeface="Al Tarikh" pitchFamily="2" charset="-78"/>
               </a:rPr>
@@ -8596,7 +8650,10 @@
           <a:p>
             <a:pPr algn="ctr"/>
             <a:r>
-              <a:rPr lang="fr-FR" sz="4400" dirty="0">
+              <a:rPr lang="fr-FR" sz="4400" b="1" dirty="0">
+                <a:solidFill>
+                  <a:srgbClr val="0070C0"/>
+                </a:solidFill>
                 <a:latin typeface="Al Tarikh" pitchFamily="2" charset="-78"/>
                 <a:cs typeface="Al Tarikh" pitchFamily="2" charset="-78"/>
               </a:rPr>
@@ -8643,7 +8700,7 @@
             </a:r>
             <a:r>
               <a:rPr lang="fr-FR" sz="2400" dirty="0"/>
-              <a:t> :				</a:t>
+              <a:t> :	66%			</a:t>
             </a:r>
           </a:p>
           <a:p>
@@ -8667,7 +8724,7 @@
             </a:r>
             <a:r>
               <a:rPr lang="fr-FR" sz="2400" dirty="0"/>
-              <a:t> Value : 		</a:t>
+              <a:t> Value : 	76%</a:t>
             </a:r>
           </a:p>
           <a:p>
@@ -8695,7 +8752,7 @@
             </a:r>
             <a:r>
               <a:rPr lang="fr-FR" sz="2400" dirty="0"/>
-              <a:t> Rate (Spécificité) :	</a:t>
+              <a:t> Rate (Spécificité) :	19%</a:t>
             </a:r>
           </a:p>
           <a:p>
@@ -8715,7 +8772,7 @@
             </a:r>
             <a:r>
               <a:rPr lang="fr-FR" sz="2400" dirty="0"/>
-              <a:t> Positive Rate (Sensitivité) :	</a:t>
+              <a:t> Positive Rate (Sensitivité) : 47%</a:t>
             </a:r>
           </a:p>
           <a:p>
@@ -8739,7 +8796,93 @@
             </a:pPr>
             <a:r>
               <a:rPr lang="fr-FR" sz="2400" dirty="0"/>
-              <a:t>False Positive Rate : 		</a:t>
+              <a:t>False Positive Rate :  8%		</a:t>
+            </a:r>
+          </a:p>
+        </p:txBody>
+      </p:sp>
+      <p:pic>
+        <p:nvPicPr>
+          <p:cNvPr id="8" name="Image 7">
+            <a:extLst>
+              <a:ext uri="{FF2B5EF4-FFF2-40B4-BE49-F238E27FC236}">
+                <a16:creationId xmlns:a16="http://schemas.microsoft.com/office/drawing/2014/main" id="{636B9603-DAF1-2A41-ADCA-9BB241E8F62A}"/>
+              </a:ext>
+            </a:extLst>
+          </p:cNvPr>
+          <p:cNvPicPr>
+            <a:picLocks noChangeAspect="1"/>
+          </p:cNvPicPr>
+          <p:nvPr/>
+        </p:nvPicPr>
+        <p:blipFill>
+          <a:blip r:embed="rId2"/>
+          <a:stretch>
+            <a:fillRect/>
+          </a:stretch>
+        </p:blipFill>
+        <p:spPr>
+          <a:xfrm>
+            <a:off x="5678522" y="1141982"/>
+            <a:ext cx="5842000" cy="4381500"/>
+          </a:xfrm>
+          <a:prstGeom prst="rect">
+            <a:avLst/>
+          </a:prstGeom>
+        </p:spPr>
+      </p:pic>
+      <p:sp>
+        <p:nvSpPr>
+          <p:cNvPr id="9" name="ZoneTexte 8">
+            <a:extLst>
+              <a:ext uri="{FF2B5EF4-FFF2-40B4-BE49-F238E27FC236}">
+                <a16:creationId xmlns:a16="http://schemas.microsoft.com/office/drawing/2014/main" id="{64CCF950-9BB4-6F49-891E-CF68828FC74B}"/>
+              </a:ext>
+            </a:extLst>
+          </p:cNvPr>
+          <p:cNvSpPr txBox="1"/>
+          <p:nvPr/>
+        </p:nvSpPr>
+        <p:spPr>
+          <a:xfrm>
+            <a:off x="7353027" y="5705588"/>
+            <a:ext cx="2494594" cy="769441"/>
+          </a:xfrm>
+          <a:prstGeom prst="rect">
+            <a:avLst/>
+          </a:prstGeom>
+          <a:noFill/>
+        </p:spPr>
+        <p:txBody>
+          <a:bodyPr wrap="none" rtlCol="0">
+            <a:spAutoFit/>
+          </a:bodyPr>
+          <a:lstStyle/>
+          <a:p>
+            <a:r>
+              <a:rPr lang="fr-FR" b="1" dirty="0">
+                <a:solidFill>
+                  <a:srgbClr val="0432FF"/>
+                </a:solidFill>
+              </a:rPr>
+              <a:t>AUC Nucléotides:	0,52</a:t>
+            </a:r>
+          </a:p>
+          <a:p>
+            <a:endParaRPr lang="fr-FR" sz="800" b="1" dirty="0">
+              <a:solidFill>
+                <a:srgbClr val="0432FF"/>
+              </a:solidFill>
+            </a:endParaRPr>
+          </a:p>
+          <a:p>
+            <a:r>
+              <a:rPr lang="fr-FR" b="1" dirty="0">
+                <a:solidFill>
+                  <a:srgbClr val="7030A0"/>
+                </a:solidFill>
+              </a:rPr>
+              <a:t>AUC Hèmes: 	0,76</a:t>
             </a:r>
           </a:p>
         </p:txBody>
@@ -8804,7 +8947,10 @@
           <a:p>
             <a:pPr algn="ctr"/>
             <a:r>
-              <a:rPr lang="fr-FR" sz="4400" dirty="0">
+              <a:rPr lang="fr-FR" sz="4400" b="1" dirty="0">
+                <a:solidFill>
+                  <a:srgbClr val="0070C0"/>
+                </a:solidFill>
                 <a:latin typeface="Al Tarikh" pitchFamily="2" charset="-78"/>
                 <a:cs typeface="Al Tarikh" pitchFamily="2" charset="-78"/>
               </a:rPr>
@@ -8850,7 +8996,7 @@
             </a:pPr>
             <a:r>
               <a:rPr lang="fr-FR" sz="2400" dirty="0"/>
-              <a:t>La précision du modèle proposé est moins bonnes que celles de DEEP DRUG 3D</a:t>
+              <a:t>La précision du modèle proposé est moins bonne que celle de DEEP DRUG 3D</a:t>
             </a:r>
           </a:p>
           <a:p>
@@ -8867,7 +9013,7 @@
             </a:pPr>
             <a:r>
               <a:rPr lang="fr-FR" sz="2400" dirty="0"/>
-              <a:t>Le taux de détection des vrais positifs et négatifs sont trop faibles</a:t>
+              <a:t>Les taux de détection des vrais positifs et vrais négatifs sont trop faibles</a:t>
             </a:r>
           </a:p>
           <a:p>

</xml_diff>